<commit_message>
final touches to Presentation
</commit_message>
<xml_diff>
--- a/ПодаточноРударство.pptx
+++ b/ПодаточноРударство.pptx
@@ -4092,14 +4092,14 @@
             </a:br>
             <a:r>
               <a:rPr lang="en-US" sz="2600" dirty="0"/>
-              <a:t>[[ TP FN ]</a:t>
+              <a:t>[[TN FP ]</a:t>
             </a:r>
             <a:br>
-              <a:rPr lang="en-US" sz="2600" dirty="0"/>
+              <a:rPr lang="en-US" sz="2600"/>
             </a:br>
             <a:r>
-              <a:rPr lang="en-US" sz="2600" dirty="0"/>
-              <a:t>[ FP TN ]]</a:t>
+              <a:rPr lang="en-US" sz="2600"/>
+              <a:t>[FN TP ]]</a:t>
             </a:r>
             <a:endParaRPr lang="mk-MK" sz="2600" dirty="0"/>
           </a:p>
@@ -4182,7 +4182,7 @@
         <p:spPr/>
         <p:txBody>
           <a:bodyPr>
-            <a:normAutofit fontScale="90000"/>
+            <a:normAutofit/>
           </a:bodyPr>
           <a:lstStyle/>
           <a:p>
@@ -7795,7 +7795,7 @@
         </p:spPr>
         <p:txBody>
           <a:bodyPr vert="horz" lIns="91440" tIns="45720" rIns="91440" bIns="45720" rtlCol="0" anchor="ctr">
-            <a:normAutofit fontScale="92500"/>
+            <a:normAutofit/>
           </a:bodyPr>
           <a:lstStyle>
             <a:lvl1pPr algn="l" defTabSz="914400" rtl="0" eaLnBrk="1" latinLnBrk="0" hangingPunct="1">
@@ -8253,7 +8253,7 @@
         </p:spPr>
         <p:txBody>
           <a:bodyPr vert="horz" lIns="91440" tIns="45720" rIns="91440" bIns="45720" rtlCol="0" anchor="ctr">
-            <a:normAutofit fontScale="92500"/>
+            <a:normAutofit/>
           </a:bodyPr>
           <a:lstStyle>
             <a:lvl1pPr algn="l" defTabSz="914400" rtl="0" eaLnBrk="1" latinLnBrk="0" hangingPunct="1">

</xml_diff>